<commit_message>
Syllbus + Tao12 + RoR
</commit_message>
<xml_diff>
--- a/slides-steve/Chapter 12.pptx
+++ b/slides-steve/Chapter 12.pptx
@@ -163,6 +163,22 @@
       </a:defRPr>
     </a:lvl9pPr>
   </p:defaultTextStyle>
+  <p:extLst>
+    <p:ext uri="{EFAFB233-063F-42B5-8137-9DF3F51BA10A}">
+      <p15:sldGuideLst xmlns:p15="http://schemas.microsoft.com/office/powerpoint/2012/main">
+        <p15:guide id="1" orient="horz" pos="2160">
+          <p15:clr>
+            <a:srgbClr val="A4A3A4"/>
+          </p15:clr>
+        </p15:guide>
+        <p15:guide id="2" pos="2880">
+          <p15:clr>
+            <a:srgbClr val="A4A3A4"/>
+          </p15:clr>
+        </p15:guide>
+      </p15:sldGuideLst>
+    </p:ext>
+  </p:extLst>
 </p:presentation>
 </file>
 
@@ -248,7 +264,7 @@
           <a:p>
             <a:fld id="{D55954FE-A24B-514D-B297-42CD79D80471}" type="datetimeFigureOut">
               <a:rPr lang="en-US" smtClean="0"/>
-              <a:t>11/2/15</a:t>
+              <a:t>9/30/16</a:t>
             </a:fld>
             <a:endParaRPr lang="en-US"/>
           </a:p>
@@ -414,7 +430,7 @@
           <a:p>
             <a:fld id="{02A4B419-AABE-4044-944F-342A12992EE3}" type="datetimeFigureOut">
               <a:rPr lang="en-US" smtClean="0"/>
-              <a:t>10/27/15</a:t>
+              <a:t>9/30/16</a:t>
             </a:fld>
             <a:endParaRPr lang="en-US"/>
           </a:p>
@@ -1569,7 +1585,7 @@
           <a:p>
             <a:fld id="{31E6AE00-9AC6-E345-9A79-9BEAA33E8160}" type="datetime1">
               <a:rPr lang="en-US" smtClean="0"/>
-              <a:t>11/2/15</a:t>
+              <a:t>9/30/16</a:t>
             </a:fld>
             <a:endParaRPr lang="en-US"/>
           </a:p>
@@ -1861,7 +1877,7 @@
           <a:p>
             <a:fld id="{DF5CA036-2D42-9B42-9CE5-692FC5DE7CF0}" type="datetime1">
               <a:rPr lang="en-US" smtClean="0"/>
-              <a:t>11/2/15</a:t>
+              <a:t>9/30/16</a:t>
             </a:fld>
             <a:endParaRPr lang="en-US"/>
           </a:p>
@@ -1983,7 +1999,7 @@
           <a:p>
             <a:fld id="{11894D10-D9BC-0149-A53E-2D5EBDB55C65}" type="datetime1">
               <a:rPr lang="en-US" smtClean="0"/>
-              <a:t>11/2/15</a:t>
+              <a:t>9/30/16</a:t>
             </a:fld>
             <a:endParaRPr lang="en-US"/>
           </a:p>
@@ -2082,7 +2098,7 @@
           <a:p>
             <a:fld id="{9DE8402C-4EC9-1A4B-8613-4E1E8DF149EB}" type="datetime1">
               <a:rPr lang="en-US" smtClean="0"/>
-              <a:t>11/2/15</a:t>
+              <a:t>9/30/16</a:t>
             </a:fld>
             <a:endParaRPr lang="en-US"/>
           </a:p>
@@ -2328,7 +2344,7 @@
           <a:p>
             <a:fld id="{AF611155-BBE0-604C-A28D-1A8F6BE0AF04}" type="datetime1">
               <a:rPr lang="en-US" smtClean="0"/>
-              <a:t>11/2/15</a:t>
+              <a:t>9/30/16</a:t>
             </a:fld>
             <a:endParaRPr lang="en-US"/>
           </a:p>
@@ -2574,7 +2590,7 @@
           <a:p>
             <a:fld id="{44263CE0-6C7A-CD41-ABAF-064B8D8B14B0}" type="datetime1">
               <a:rPr lang="en-US" smtClean="0"/>
-              <a:t>11/2/15</a:t>
+              <a:t>9/30/16</a:t>
             </a:fld>
             <a:endParaRPr lang="en-US"/>
           </a:p>
@@ -2966,7 +2982,11 @@
           <a:p>
             <a:r>
               <a:rPr lang="en-US" dirty="0" smtClean="0"/>
-              <a:t>Chapter Twelve</a:t>
+              <a:t>Chapter </a:t>
+            </a:r>
+            <a:r>
+              <a:rPr lang="en-US" dirty="0" smtClean="0"/>
+              <a:t>12</a:t>
             </a:r>
             <a:endParaRPr lang="en-US" dirty="0"/>
           </a:p>
@@ -3005,13 +3025,13 @@
   <p:clrMapOvr>
     <a:masterClrMapping/>
   </p:clrMapOvr>
-  <mc:AlternateContent xmlns:mc="http://schemas.openxmlformats.org/markup-compatibility/2006">
-    <mc:Choice xmlns:p14="http://schemas.microsoft.com/office/powerpoint/2010/main" Requires="p14">
+  <mc:AlternateContent xmlns:mc="http://schemas.openxmlformats.org/markup-compatibility/2006" xmlns:p14="http://schemas.microsoft.com/office/powerpoint/2010/main">
+    <mc:Choice Requires="p14">
       <p:transition spd="slow" p14:dur="1200">
         <p14:prism/>
       </p:transition>
     </mc:Choice>
-    <mc:Fallback>
+    <mc:Fallback xmlns="">
       <p:transition xmlns:p14="http://schemas.microsoft.com/office/powerpoint/2010/main" spd="slow">
         <p:fade/>
       </p:transition>
@@ -3020,7 +3040,7 @@
   <p:timing>
     <p:tnLst>
       <p:par>
-        <p:cTn xmlns:p14="http://schemas.microsoft.com/office/powerpoint/2010/main" id="1" dur="indefinite" restart="never" nodeType="tmRoot"/>
+        <p:cTn id="1" dur="indefinite" restart="never" nodeType="tmRoot"/>
       </p:par>
     </p:tnLst>
   </p:timing>
@@ -3188,7 +3208,7 @@
           <a:p>
             <a:fld id="{4E7F7E96-CB82-1B4A-9330-BD83F71F6108}" type="datetime1">
               <a:rPr lang="en-US" smtClean="0"/>
-              <a:t>11/2/15</a:t>
+              <a:t>9/30/16</a:t>
             </a:fld>
             <a:endParaRPr lang="en-US"/>
           </a:p>
@@ -3250,13 +3270,13 @@
   <p:clrMapOvr>
     <a:masterClrMapping/>
   </p:clrMapOvr>
-  <mc:AlternateContent xmlns:mc="http://schemas.openxmlformats.org/markup-compatibility/2006">
-    <mc:Choice xmlns:p14="http://schemas.microsoft.com/office/powerpoint/2010/main" Requires="p14">
+  <mc:AlternateContent xmlns:mc="http://schemas.openxmlformats.org/markup-compatibility/2006" xmlns:p14="http://schemas.microsoft.com/office/powerpoint/2010/main">
+    <mc:Choice Requires="p14">
       <p:transition spd="slow" p14:dur="1200">
         <p14:prism/>
       </p:transition>
     </mc:Choice>
-    <mc:Fallback>
+    <mc:Fallback xmlns="">
       <p:transition xmlns:p14="http://schemas.microsoft.com/office/powerpoint/2010/main" spd="slow">
         <p:fade/>
       </p:transition>
@@ -3265,7 +3285,7 @@
   <p:timing>
     <p:tnLst>
       <p:par>
-        <p:cTn xmlns:p14="http://schemas.microsoft.com/office/powerpoint/2010/main" id="1" dur="indefinite" restart="never" nodeType="tmRoot"/>
+        <p:cTn id="1" dur="indefinite" restart="never" nodeType="tmRoot"/>
       </p:par>
     </p:tnLst>
   </p:timing>
@@ -3336,7 +3356,7 @@
           <a:p>
             <a:fld id="{4580AE06-AF43-6C4D-A1E2-49C653E9C98A}" type="datetime1">
               <a:rPr lang="en-US" smtClean="0"/>
-              <a:t>11/2/15</a:t>
+              <a:t>9/30/16</a:t>
             </a:fld>
             <a:endParaRPr lang="en-US"/>
           </a:p>
@@ -3398,13 +3418,13 @@
   <p:clrMapOvr>
     <a:masterClrMapping/>
   </p:clrMapOvr>
-  <mc:AlternateContent xmlns:mc="http://schemas.openxmlformats.org/markup-compatibility/2006">
-    <mc:Choice xmlns:p14="http://schemas.microsoft.com/office/powerpoint/2010/main" Requires="p14">
+  <mc:AlternateContent xmlns:mc="http://schemas.openxmlformats.org/markup-compatibility/2006" xmlns:p14="http://schemas.microsoft.com/office/powerpoint/2010/main">
+    <mc:Choice Requires="p14">
       <p:transition spd="slow" p14:dur="1200">
         <p14:prism/>
       </p:transition>
     </mc:Choice>
-    <mc:Fallback>
+    <mc:Fallback xmlns="">
       <p:transition xmlns:p14="http://schemas.microsoft.com/office/powerpoint/2010/main" spd="slow">
         <p:fade/>
       </p:transition>
@@ -3413,7 +3433,7 @@
   <p:timing>
     <p:tnLst>
       <p:par>
-        <p:cTn xmlns:p14="http://schemas.microsoft.com/office/powerpoint/2010/main" id="1" dur="indefinite" restart="never" nodeType="tmRoot"/>
+        <p:cTn id="1" dur="indefinite" restart="never" nodeType="tmRoot"/>
       </p:par>
     </p:tnLst>
   </p:timing>
@@ -3502,7 +3522,7 @@
           <a:p>
             <a:fld id="{FC3F88AF-807B-3A44-9855-550346EDC5AF}" type="datetime1">
               <a:rPr lang="en-US" smtClean="0"/>
-              <a:t>11/2/15</a:t>
+              <a:t>9/30/16</a:t>
             </a:fld>
             <a:endParaRPr lang="en-US"/>
           </a:p>
@@ -3564,13 +3584,13 @@
   <p:clrMapOvr>
     <a:masterClrMapping/>
   </p:clrMapOvr>
-  <mc:AlternateContent xmlns:mc="http://schemas.openxmlformats.org/markup-compatibility/2006">
-    <mc:Choice xmlns:p14="http://schemas.microsoft.com/office/powerpoint/2010/main" Requires="p14">
+  <mc:AlternateContent xmlns:mc="http://schemas.openxmlformats.org/markup-compatibility/2006" xmlns:p14="http://schemas.microsoft.com/office/powerpoint/2010/main">
+    <mc:Choice Requires="p14">
       <p:transition spd="slow" p14:dur="1200">
         <p14:prism/>
       </p:transition>
     </mc:Choice>
-    <mc:Fallback>
+    <mc:Fallback xmlns="">
       <p:transition xmlns:p14="http://schemas.microsoft.com/office/powerpoint/2010/main" spd="slow">
         <p:fade/>
       </p:transition>
@@ -3579,7 +3599,7 @@
   <p:timing>
     <p:tnLst>
       <p:par>
-        <p:cTn xmlns:p14="http://schemas.microsoft.com/office/powerpoint/2010/main" id="1" dur="indefinite" restart="never" nodeType="tmRoot"/>
+        <p:cTn id="1" dur="indefinite" restart="never" nodeType="tmRoot"/>
       </p:par>
     </p:tnLst>
   </p:timing>
@@ -3668,7 +3688,7 @@
           <a:p>
             <a:fld id="{BBB8FBE0-B58D-374F-BCBA-3450DF78BF69}" type="datetime1">
               <a:rPr lang="en-US" smtClean="0"/>
-              <a:t>11/2/15</a:t>
+              <a:t>9/30/16</a:t>
             </a:fld>
             <a:endParaRPr lang="en-US"/>
           </a:p>
@@ -3730,13 +3750,13 @@
   <p:clrMapOvr>
     <a:masterClrMapping/>
   </p:clrMapOvr>
-  <mc:AlternateContent xmlns:mc="http://schemas.openxmlformats.org/markup-compatibility/2006">
-    <mc:Choice xmlns:p14="http://schemas.microsoft.com/office/powerpoint/2010/main" Requires="p14">
+  <mc:AlternateContent xmlns:mc="http://schemas.openxmlformats.org/markup-compatibility/2006" xmlns:p14="http://schemas.microsoft.com/office/powerpoint/2010/main">
+    <mc:Choice Requires="p14">
       <p:transition spd="slow" p14:dur="1200">
         <p14:prism/>
       </p:transition>
     </mc:Choice>
-    <mc:Fallback>
+    <mc:Fallback xmlns="">
       <p:transition xmlns:p14="http://schemas.microsoft.com/office/powerpoint/2010/main" spd="slow">
         <p:fade/>
       </p:transition>
@@ -3745,7 +3765,7 @@
   <p:timing>
     <p:tnLst>
       <p:par>
-        <p:cTn xmlns:p14="http://schemas.microsoft.com/office/powerpoint/2010/main" id="1" dur="indefinite" restart="never" nodeType="tmRoot"/>
+        <p:cTn id="1" dur="indefinite" restart="never" nodeType="tmRoot"/>
       </p:par>
     </p:tnLst>
   </p:timing>
@@ -3839,7 +3859,7 @@
           <a:p>
             <a:fld id="{E9B8FCE7-5B00-9348-AD71-CB158C5736A7}" type="datetime1">
               <a:rPr lang="en-US" smtClean="0"/>
-              <a:t>11/2/15</a:t>
+              <a:t>9/30/16</a:t>
             </a:fld>
             <a:endParaRPr lang="en-US"/>
           </a:p>
@@ -3901,13 +3921,13 @@
   <p:clrMapOvr>
     <a:masterClrMapping/>
   </p:clrMapOvr>
-  <mc:AlternateContent xmlns:mc="http://schemas.openxmlformats.org/markup-compatibility/2006">
-    <mc:Choice xmlns:p14="http://schemas.microsoft.com/office/powerpoint/2010/main" Requires="p14">
+  <mc:AlternateContent xmlns:mc="http://schemas.openxmlformats.org/markup-compatibility/2006" xmlns:p14="http://schemas.microsoft.com/office/powerpoint/2010/main">
+    <mc:Choice Requires="p14">
       <p:transition spd="slow" p14:dur="1200">
         <p14:prism/>
       </p:transition>
     </mc:Choice>
-    <mc:Fallback>
+    <mc:Fallback xmlns="">
       <p:transition xmlns:p14="http://schemas.microsoft.com/office/powerpoint/2010/main" spd="slow">
         <p:fade/>
       </p:transition>
@@ -3916,7 +3936,7 @@
   <p:timing>
     <p:tnLst>
       <p:par>
-        <p:cTn xmlns:p14="http://schemas.microsoft.com/office/powerpoint/2010/main" id="1" dur="indefinite" restart="never" nodeType="tmRoot"/>
+        <p:cTn id="1" dur="indefinite" restart="never" nodeType="tmRoot"/>
       </p:par>
     </p:tnLst>
   </p:timing>
@@ -4005,7 +4025,7 @@
           <a:p>
             <a:fld id="{A9788EBC-370D-A04C-99FF-32FA98E25AF6}" type="datetime1">
               <a:rPr lang="en-US" smtClean="0"/>
-              <a:t>11/2/15</a:t>
+              <a:t>9/30/16</a:t>
             </a:fld>
             <a:endParaRPr lang="en-US"/>
           </a:p>
@@ -4067,13 +4087,13 @@
   <p:clrMapOvr>
     <a:masterClrMapping/>
   </p:clrMapOvr>
-  <mc:AlternateContent xmlns:mc="http://schemas.openxmlformats.org/markup-compatibility/2006">
-    <mc:Choice xmlns:p14="http://schemas.microsoft.com/office/powerpoint/2010/main" Requires="p14">
+  <mc:AlternateContent xmlns:mc="http://schemas.openxmlformats.org/markup-compatibility/2006" xmlns:p14="http://schemas.microsoft.com/office/powerpoint/2010/main">
+    <mc:Choice Requires="p14">
       <p:transition spd="slow" p14:dur="1200">
         <p14:prism/>
       </p:transition>
     </mc:Choice>
-    <mc:Fallback>
+    <mc:Fallback xmlns="">
       <p:transition xmlns:p14="http://schemas.microsoft.com/office/powerpoint/2010/main" spd="slow">
         <p:fade/>
       </p:transition>
@@ -4082,7 +4102,7 @@
   <p:timing>
     <p:tnLst>
       <p:par>
-        <p:cTn xmlns:p14="http://schemas.microsoft.com/office/powerpoint/2010/main" id="1" dur="indefinite" restart="never" nodeType="tmRoot"/>
+        <p:cTn id="1" dur="indefinite" restart="never" nodeType="tmRoot"/>
       </p:par>
     </p:tnLst>
   </p:timing>
@@ -4171,7 +4191,7 @@
           <a:p>
             <a:fld id="{37C6997C-10BB-FC4C-9442-7A67014D050C}" type="datetime1">
               <a:rPr lang="en-US" smtClean="0"/>
-              <a:t>11/2/15</a:t>
+              <a:t>9/30/16</a:t>
             </a:fld>
             <a:endParaRPr lang="en-US"/>
           </a:p>
@@ -4233,13 +4253,13 @@
   <p:clrMapOvr>
     <a:masterClrMapping/>
   </p:clrMapOvr>
-  <mc:AlternateContent xmlns:mc="http://schemas.openxmlformats.org/markup-compatibility/2006">
-    <mc:Choice xmlns:p14="http://schemas.microsoft.com/office/powerpoint/2010/main" Requires="p14">
+  <mc:AlternateContent xmlns:mc="http://schemas.openxmlformats.org/markup-compatibility/2006" xmlns:p14="http://schemas.microsoft.com/office/powerpoint/2010/main">
+    <mc:Choice Requires="p14">
       <p:transition spd="slow" p14:dur="1200">
         <p14:prism/>
       </p:transition>
     </mc:Choice>
-    <mc:Fallback>
+    <mc:Fallback xmlns="">
       <p:transition xmlns:p14="http://schemas.microsoft.com/office/powerpoint/2010/main" spd="slow">
         <p:fade/>
       </p:transition>
@@ -4248,7 +4268,7 @@
   <p:timing>
     <p:tnLst>
       <p:par>
-        <p:cTn xmlns:p14="http://schemas.microsoft.com/office/powerpoint/2010/main" id="1" dur="indefinite" restart="never" nodeType="tmRoot"/>
+        <p:cTn id="1" dur="indefinite" restart="never" nodeType="tmRoot"/>
       </p:par>
     </p:tnLst>
   </p:timing>
@@ -4381,7 +4401,7 @@
           <a:p>
             <a:fld id="{AEA9CF73-8357-2F48-B9A3-DFFC207C9654}" type="datetime1">
               <a:rPr lang="en-US" smtClean="0"/>
-              <a:t>11/2/15</a:t>
+              <a:t>9/30/16</a:t>
             </a:fld>
             <a:endParaRPr lang="en-US"/>
           </a:p>
@@ -4443,13 +4463,13 @@
   <p:clrMapOvr>
     <a:masterClrMapping/>
   </p:clrMapOvr>
-  <mc:AlternateContent xmlns:mc="http://schemas.openxmlformats.org/markup-compatibility/2006">
-    <mc:Choice xmlns:p14="http://schemas.microsoft.com/office/powerpoint/2010/main" Requires="p14">
+  <mc:AlternateContent xmlns:mc="http://schemas.openxmlformats.org/markup-compatibility/2006" xmlns:p14="http://schemas.microsoft.com/office/powerpoint/2010/main">
+    <mc:Choice Requires="p14">
       <p:transition spd="slow" p14:dur="1200">
         <p14:prism/>
       </p:transition>
     </mc:Choice>
-    <mc:Fallback>
+    <mc:Fallback xmlns="">
       <p:transition xmlns:p14="http://schemas.microsoft.com/office/powerpoint/2010/main" spd="slow">
         <p:fade/>
       </p:transition>
@@ -4458,7 +4478,7 @@
   <p:timing>
     <p:tnLst>
       <p:par>
-        <p:cTn xmlns:p14="http://schemas.microsoft.com/office/powerpoint/2010/main" id="1" dur="indefinite" restart="never" nodeType="tmRoot"/>
+        <p:cTn id="1" dur="indefinite" restart="never" nodeType="tmRoot"/>
       </p:par>
     </p:tnLst>
   </p:timing>
@@ -4576,7 +4596,7 @@
           <a:p>
             <a:fld id="{EA05ADF2-22B4-C748-936D-8DDC004FC7B5}" type="datetime1">
               <a:rPr lang="en-US" smtClean="0"/>
-              <a:t>11/2/15</a:t>
+              <a:t>9/30/16</a:t>
             </a:fld>
             <a:endParaRPr lang="en-US"/>
           </a:p>
@@ -4638,13 +4658,13 @@
   <p:clrMapOvr>
     <a:masterClrMapping/>
   </p:clrMapOvr>
-  <mc:AlternateContent xmlns:mc="http://schemas.openxmlformats.org/markup-compatibility/2006">
-    <mc:Choice xmlns:p14="http://schemas.microsoft.com/office/powerpoint/2010/main" Requires="p14">
+  <mc:AlternateContent xmlns:mc="http://schemas.openxmlformats.org/markup-compatibility/2006" xmlns:p14="http://schemas.microsoft.com/office/powerpoint/2010/main">
+    <mc:Choice Requires="p14">
       <p:transition spd="slow" p14:dur="1200">
         <p14:prism/>
       </p:transition>
     </mc:Choice>
-    <mc:Fallback>
+    <mc:Fallback xmlns="">
       <p:transition xmlns:p14="http://schemas.microsoft.com/office/powerpoint/2010/main" spd="slow">
         <p:fade/>
       </p:transition>
@@ -4653,7 +4673,7 @@
   <p:timing>
     <p:tnLst>
       <p:par>
-        <p:cTn xmlns:p14="http://schemas.microsoft.com/office/powerpoint/2010/main" id="1" dur="indefinite" restart="never" nodeType="tmRoot"/>
+        <p:cTn id="1" dur="indefinite" restart="never" nodeType="tmRoot"/>
       </p:par>
     </p:tnLst>
   </p:timing>
@@ -4766,7 +4786,7 @@
           <a:p>
             <a:fld id="{FB0FB0B7-D455-274C-B0D7-6EE1F92B7340}" type="datetime1">
               <a:rPr lang="en-US" smtClean="0"/>
-              <a:t>11/2/15</a:t>
+              <a:t>9/30/16</a:t>
             </a:fld>
             <a:endParaRPr lang="en-US"/>
           </a:p>
@@ -4828,13 +4848,13 @@
   <p:clrMapOvr>
     <a:masterClrMapping/>
   </p:clrMapOvr>
-  <mc:AlternateContent xmlns:mc="http://schemas.openxmlformats.org/markup-compatibility/2006">
-    <mc:Choice xmlns:p14="http://schemas.microsoft.com/office/powerpoint/2010/main" Requires="p14">
+  <mc:AlternateContent xmlns:mc="http://schemas.openxmlformats.org/markup-compatibility/2006" xmlns:p14="http://schemas.microsoft.com/office/powerpoint/2010/main">
+    <mc:Choice Requires="p14">
       <p:transition spd="slow" p14:dur="1200">
         <p14:prism/>
       </p:transition>
     </mc:Choice>
-    <mc:Fallback>
+    <mc:Fallback xmlns="">
       <p:transition xmlns:p14="http://schemas.microsoft.com/office/powerpoint/2010/main" spd="slow">
         <p:fade/>
       </p:transition>
@@ -4843,7 +4863,7 @@
   <p:timing>
     <p:tnLst>
       <p:par>
-        <p:cTn xmlns:p14="http://schemas.microsoft.com/office/powerpoint/2010/main" id="1" dur="indefinite" restart="never" nodeType="tmRoot"/>
+        <p:cTn id="1" dur="indefinite" restart="never" nodeType="tmRoot"/>
       </p:par>
     </p:tnLst>
   </p:timing>
@@ -4947,7 +4967,7 @@
           <a:p>
             <a:fld id="{4579D991-5E78-A741-A165-6371DCEE3458}" type="datetime1">
               <a:rPr lang="en-US" smtClean="0"/>
-              <a:t>11/2/15</a:t>
+              <a:t>9/30/16</a:t>
             </a:fld>
             <a:endParaRPr lang="en-US"/>
           </a:p>
@@ -5009,13 +5029,13 @@
   <p:clrMapOvr>
     <a:masterClrMapping/>
   </p:clrMapOvr>
-  <mc:AlternateContent xmlns:mc="http://schemas.openxmlformats.org/markup-compatibility/2006">
-    <mc:Choice xmlns:p14="http://schemas.microsoft.com/office/powerpoint/2010/main" Requires="p14">
+  <mc:AlternateContent xmlns:mc="http://schemas.openxmlformats.org/markup-compatibility/2006" xmlns:p14="http://schemas.microsoft.com/office/powerpoint/2010/main">
+    <mc:Choice Requires="p14">
       <p:transition spd="slow" p14:dur="1200">
         <p14:prism/>
       </p:transition>
     </mc:Choice>
-    <mc:Fallback>
+    <mc:Fallback xmlns="">
       <p:transition xmlns:p14="http://schemas.microsoft.com/office/powerpoint/2010/main" spd="slow">
         <p:fade/>
       </p:transition>
@@ -5024,7 +5044,7 @@
   <p:timing>
     <p:tnLst>
       <p:par>
-        <p:cTn xmlns:p14="http://schemas.microsoft.com/office/powerpoint/2010/main" id="1" dur="indefinite" restart="never" nodeType="tmRoot"/>
+        <p:cTn id="1" dur="indefinite" restart="never" nodeType="tmRoot"/>
       </p:par>
     </p:tnLst>
   </p:timing>
@@ -5169,7 +5189,7 @@
           <a:p>
             <a:fld id="{297A533A-0094-424B-B487-5E04002D241E}" type="datetime1">
               <a:rPr lang="en-US" smtClean="0"/>
-              <a:t>11/2/15</a:t>
+              <a:t>9/30/16</a:t>
             </a:fld>
             <a:endParaRPr lang="en-US"/>
           </a:p>
@@ -5231,13 +5251,13 @@
   <p:clrMapOvr>
     <a:masterClrMapping/>
   </p:clrMapOvr>
-  <mc:AlternateContent xmlns:mc="http://schemas.openxmlformats.org/markup-compatibility/2006">
-    <mc:Choice xmlns:p14="http://schemas.microsoft.com/office/powerpoint/2010/main" Requires="p14">
+  <mc:AlternateContent xmlns:mc="http://schemas.openxmlformats.org/markup-compatibility/2006" xmlns:p14="http://schemas.microsoft.com/office/powerpoint/2010/main">
+    <mc:Choice Requires="p14">
       <p:transition spd="slow" p14:dur="1200">
         <p14:prism/>
       </p:transition>
     </mc:Choice>
-    <mc:Fallback>
+    <mc:Fallback xmlns="">
       <p:transition xmlns:p14="http://schemas.microsoft.com/office/powerpoint/2010/main" spd="slow">
         <p:fade/>
       </p:transition>
@@ -5246,7 +5266,7 @@
   <p:timing>
     <p:tnLst>
       <p:par>
-        <p:cTn xmlns:p14="http://schemas.microsoft.com/office/powerpoint/2010/main" id="1" dur="indefinite" restart="never" nodeType="tmRoot"/>
+        <p:cTn id="1" dur="indefinite" restart="never" nodeType="tmRoot"/>
       </p:par>
     </p:tnLst>
   </p:timing>
@@ -5463,7 +5483,7 @@
           <a:p>
             <a:fld id="{0755C48E-4CC7-D54B-B613-799CE91C41B3}" type="datetime1">
               <a:rPr lang="en-US" smtClean="0"/>
-              <a:t>11/2/15</a:t>
+              <a:t>9/30/16</a:t>
             </a:fld>
             <a:endParaRPr lang="en-US"/>
           </a:p>
@@ -5525,13 +5545,13 @@
   <p:clrMapOvr>
     <a:masterClrMapping/>
   </p:clrMapOvr>
-  <mc:AlternateContent xmlns:mc="http://schemas.openxmlformats.org/markup-compatibility/2006">
-    <mc:Choice xmlns:p14="http://schemas.microsoft.com/office/powerpoint/2010/main" Requires="p14">
+  <mc:AlternateContent xmlns:mc="http://schemas.openxmlformats.org/markup-compatibility/2006" xmlns:p14="http://schemas.microsoft.com/office/powerpoint/2010/main">
+    <mc:Choice Requires="p14">
       <p:transition spd="slow" p14:dur="1200">
         <p14:prism/>
       </p:transition>
     </mc:Choice>
-    <mc:Fallback>
+    <mc:Fallback xmlns="">
       <p:transition xmlns:p14="http://schemas.microsoft.com/office/powerpoint/2010/main" spd="slow">
         <p:fade/>
       </p:transition>
@@ -5540,7 +5560,7 @@
   <p:timing>
     <p:tnLst>
       <p:par>
-        <p:cTn xmlns:p14="http://schemas.microsoft.com/office/powerpoint/2010/main" id="1" dur="indefinite" restart="never" nodeType="tmRoot"/>
+        <p:cTn id="1" dur="indefinite" restart="never" nodeType="tmRoot"/>
       </p:par>
     </p:tnLst>
   </p:timing>
@@ -5788,7 +5808,7 @@
           <a:p>
             <a:fld id="{184939E5-0FB1-AA48-881E-60161F81B19B}" type="datetime1">
               <a:rPr lang="en-US" smtClean="0"/>
-              <a:t>11/2/15</a:t>
+              <a:t>9/30/16</a:t>
             </a:fld>
             <a:endParaRPr lang="en-US"/>
           </a:p>
@@ -5850,13 +5870,13 @@
   <p:clrMapOvr>
     <a:masterClrMapping/>
   </p:clrMapOvr>
-  <mc:AlternateContent xmlns:mc="http://schemas.openxmlformats.org/markup-compatibility/2006">
-    <mc:Choice xmlns:p14="http://schemas.microsoft.com/office/powerpoint/2010/main" Requires="p14">
+  <mc:AlternateContent xmlns:mc="http://schemas.openxmlformats.org/markup-compatibility/2006" xmlns:p14="http://schemas.microsoft.com/office/powerpoint/2010/main">
+    <mc:Choice Requires="p14">
       <p:transition spd="slow" p14:dur="1200">
         <p14:prism/>
       </p:transition>
     </mc:Choice>
-    <mc:Fallback>
+    <mc:Fallback xmlns="">
       <p:transition xmlns:p14="http://schemas.microsoft.com/office/powerpoint/2010/main" spd="slow">
         <p:fade/>
       </p:transition>
@@ -5865,7 +5885,7 @@
   <p:timing>
     <p:tnLst>
       <p:par>
-        <p:cTn xmlns:p14="http://schemas.microsoft.com/office/powerpoint/2010/main" id="1" dur="indefinite" restart="never" nodeType="tmRoot"/>
+        <p:cTn id="1" dur="indefinite" restart="never" nodeType="tmRoot"/>
       </p:par>
     </p:tnLst>
   </p:timing>
@@ -6137,7 +6157,7 @@
           <a:p>
             <a:fld id="{11FF9C96-CCC4-3B4A-ABED-3025753512A5}" type="datetime1">
               <a:rPr lang="en-US" smtClean="0"/>
-              <a:t>11/2/15</a:t>
+              <a:t>9/30/16</a:t>
             </a:fld>
             <a:endParaRPr lang="en-US"/>
           </a:p>
@@ -6199,13 +6219,13 @@
   <p:clrMapOvr>
     <a:masterClrMapping/>
   </p:clrMapOvr>
-  <mc:AlternateContent xmlns:mc="http://schemas.openxmlformats.org/markup-compatibility/2006">
-    <mc:Choice xmlns:p14="http://schemas.microsoft.com/office/powerpoint/2010/main" Requires="p14">
+  <mc:AlternateContent xmlns:mc="http://schemas.openxmlformats.org/markup-compatibility/2006" xmlns:p14="http://schemas.microsoft.com/office/powerpoint/2010/main">
+    <mc:Choice Requires="p14">
       <p:transition spd="slow" p14:dur="1200">
         <p14:prism/>
       </p:transition>
     </mc:Choice>
-    <mc:Fallback>
+    <mc:Fallback xmlns="">
       <p:transition xmlns:p14="http://schemas.microsoft.com/office/powerpoint/2010/main" spd="slow">
         <p:fade/>
       </p:transition>
@@ -6214,7 +6234,7 @@
   <p:timing>
     <p:tnLst>
       <p:par>
-        <p:cTn xmlns:p14="http://schemas.microsoft.com/office/powerpoint/2010/main" id="1" dur="indefinite" restart="never" nodeType="tmRoot"/>
+        <p:cTn id="1" dur="indefinite" restart="never" nodeType="tmRoot"/>
       </p:par>
     </p:tnLst>
   </p:timing>
@@ -6372,7 +6392,7 @@
           <a:p>
             <a:fld id="{DA299FFD-91AF-234C-8CF8-E5DFEB655CC4}" type="datetime1">
               <a:rPr lang="en-US" smtClean="0"/>
-              <a:t>11/2/15</a:t>
+              <a:t>9/30/16</a:t>
             </a:fld>
             <a:endParaRPr lang="en-US"/>
           </a:p>
@@ -6434,13 +6454,13 @@
   <p:clrMapOvr>
     <a:masterClrMapping/>
   </p:clrMapOvr>
-  <mc:AlternateContent xmlns:mc="http://schemas.openxmlformats.org/markup-compatibility/2006">
-    <mc:Choice xmlns:p14="http://schemas.microsoft.com/office/powerpoint/2010/main" Requires="p14">
+  <mc:AlternateContent xmlns:mc="http://schemas.openxmlformats.org/markup-compatibility/2006" xmlns:p14="http://schemas.microsoft.com/office/powerpoint/2010/main">
+    <mc:Choice Requires="p14">
       <p:transition spd="slow" p14:dur="1200">
         <p14:prism/>
       </p:transition>
     </mc:Choice>
-    <mc:Fallback>
+    <mc:Fallback xmlns="">
       <p:transition xmlns:p14="http://schemas.microsoft.com/office/powerpoint/2010/main" spd="slow">
         <p:fade/>
       </p:transition>
@@ -6449,7 +6469,7 @@
   <p:timing>
     <p:tnLst>
       <p:par>
-        <p:cTn xmlns:p14="http://schemas.microsoft.com/office/powerpoint/2010/main" id="1" dur="indefinite" restart="never" nodeType="tmRoot"/>
+        <p:cTn id="1" dur="indefinite" restart="never" nodeType="tmRoot"/>
       </p:par>
     </p:tnLst>
   </p:timing>
@@ -6622,14 +6642,35 @@
                 <a:latin typeface="Courier"/>
                 <a:cs typeface="Courier"/>
               </a:rPr>
-              <a:t>		NASA </a:t>
+              <a:t>		</a:t>
+            </a:r>
+            <a:r>
+              <a:rPr lang="en-US" sz="1400" dirty="0" smtClean="0">
+                <a:latin typeface="Courier"/>
+                <a:cs typeface="Courier"/>
+              </a:rPr>
+              <a:t>	NASA </a:t>
             </a:r>
             <a:r>
               <a:rPr lang="en-US" sz="1400" dirty="0">
                 <a:latin typeface="Courier"/>
                 <a:cs typeface="Courier"/>
               </a:rPr>
-              <a:t>(Ames Research Center)</a:t>
+              <a:t>(Ames Research </a:t>
+            </a:r>
+            <a:r>
+              <a:rPr lang="en-US" sz="1400" dirty="0" err="1" smtClean="0">
+                <a:latin typeface="Courier"/>
+                <a:cs typeface="Courier"/>
+              </a:rPr>
+              <a:t>Ctr</a:t>
+            </a:r>
+            <a:r>
+              <a:rPr lang="en-US" sz="1400" dirty="0">
+                <a:latin typeface="Courier"/>
+                <a:cs typeface="Courier"/>
+              </a:rPr>
+              <a:t>)</a:t>
             </a:r>
           </a:p>
           <a:p>
@@ -6695,11 +6736,11 @@
               <a:t>Department of </a:t>
             </a:r>
             <a:r>
-              <a:rPr lang="en-US" sz="1400" dirty="0" err="1" smtClean="0">
+              <a:rPr lang="en-US" sz="1400" dirty="0" smtClean="0">
                 <a:latin typeface="Courier"/>
                 <a:cs typeface="Courier"/>
               </a:rPr>
-              <a:t>Defence</a:t>
+              <a:t>Defense</a:t>
             </a:r>
             <a:endParaRPr lang="en-US" sz="1400" dirty="0">
               <a:latin typeface="Courier"/>
@@ -6875,7 +6916,7 @@
           <a:p>
             <a:fld id="{83FFD5EA-BFE0-324F-B2AC-336E74E5F475}" type="datetime1">
               <a:rPr lang="en-US" smtClean="0"/>
-              <a:t>11/2/15</a:t>
+              <a:t>9/30/16</a:t>
             </a:fld>
             <a:endParaRPr lang="en-US"/>
           </a:p>
@@ -6937,13 +6978,13 @@
   <p:clrMapOvr>
     <a:masterClrMapping/>
   </p:clrMapOvr>
-  <mc:AlternateContent xmlns:mc="http://schemas.openxmlformats.org/markup-compatibility/2006">
-    <mc:Choice xmlns:p14="http://schemas.microsoft.com/office/powerpoint/2010/main" Requires="p14">
+  <mc:AlternateContent xmlns:mc="http://schemas.openxmlformats.org/markup-compatibility/2006" xmlns:p14="http://schemas.microsoft.com/office/powerpoint/2010/main">
+    <mc:Choice Requires="p14">
       <p:transition spd="slow" p14:dur="1200">
         <p14:prism/>
       </p:transition>
     </mc:Choice>
-    <mc:Fallback>
+    <mc:Fallback xmlns="">
       <p:transition xmlns:p14="http://schemas.microsoft.com/office/powerpoint/2010/main" spd="slow">
         <p:fade/>
       </p:transition>
@@ -6952,7 +6993,7 @@
   <p:timing>
     <p:tnLst>
       <p:par>
-        <p:cTn xmlns:p14="http://schemas.microsoft.com/office/powerpoint/2010/main" id="1" dur="indefinite" restart="never" nodeType="tmRoot"/>
+        <p:cTn id="1" dur="indefinite" restart="never" nodeType="tmRoot"/>
       </p:par>
     </p:tnLst>
   </p:timing>
@@ -7041,7 +7082,7 @@
           <a:p>
             <a:fld id="{010EBF80-321D-9140-AB86-8DBE34254EDE}" type="datetime1">
               <a:rPr lang="en-US" smtClean="0"/>
-              <a:t>11/2/15</a:t>
+              <a:t>9/30/16</a:t>
             </a:fld>
             <a:endParaRPr lang="en-US"/>
           </a:p>
@@ -7103,13 +7144,13 @@
   <p:clrMapOvr>
     <a:masterClrMapping/>
   </p:clrMapOvr>
-  <mc:AlternateContent xmlns:mc="http://schemas.openxmlformats.org/markup-compatibility/2006">
-    <mc:Choice xmlns:p14="http://schemas.microsoft.com/office/powerpoint/2010/main" Requires="p14">
+  <mc:AlternateContent xmlns:mc="http://schemas.openxmlformats.org/markup-compatibility/2006" xmlns:p14="http://schemas.microsoft.com/office/powerpoint/2010/main">
+    <mc:Choice Requires="p14">
       <p:transition spd="slow" p14:dur="1200">
         <p14:prism/>
       </p:transition>
     </mc:Choice>
-    <mc:Fallback>
+    <mc:Fallback xmlns="">
       <p:transition xmlns:p14="http://schemas.microsoft.com/office/powerpoint/2010/main" spd="slow">
         <p:fade/>
       </p:transition>
@@ -7118,7 +7159,7 @@
   <p:timing>
     <p:tnLst>
       <p:par>
-        <p:cTn xmlns:p14="http://schemas.microsoft.com/office/powerpoint/2010/main" id="1" dur="indefinite" restart="never" nodeType="tmRoot"/>
+        <p:cTn id="1" dur="indefinite" restart="never" nodeType="tmRoot"/>
       </p:par>
     </p:tnLst>
   </p:timing>
@@ -7207,7 +7248,7 @@
           <a:p>
             <a:fld id="{152CB76D-8E18-F840-AC41-CF54D943ED3B}" type="datetime1">
               <a:rPr lang="en-US" smtClean="0"/>
-              <a:t>11/2/15</a:t>
+              <a:t>9/30/16</a:t>
             </a:fld>
             <a:endParaRPr lang="en-US"/>
           </a:p>
@@ -7269,13 +7310,13 @@
   <p:clrMapOvr>
     <a:masterClrMapping/>
   </p:clrMapOvr>
-  <mc:AlternateContent xmlns:mc="http://schemas.openxmlformats.org/markup-compatibility/2006">
-    <mc:Choice xmlns:p14="http://schemas.microsoft.com/office/powerpoint/2010/main" Requires="p14">
+  <mc:AlternateContent xmlns:mc="http://schemas.openxmlformats.org/markup-compatibility/2006" xmlns:p14="http://schemas.microsoft.com/office/powerpoint/2010/main">
+    <mc:Choice Requires="p14">
       <p:transition spd="slow" p14:dur="1200">
         <p14:prism/>
       </p:transition>
     </mc:Choice>
-    <mc:Fallback>
+    <mc:Fallback xmlns="">
       <p:transition xmlns:p14="http://schemas.microsoft.com/office/powerpoint/2010/main" spd="slow">
         <p:fade/>
       </p:transition>
@@ -7284,7 +7325,7 @@
   <p:timing>
     <p:tnLst>
       <p:par>
-        <p:cTn xmlns:p14="http://schemas.microsoft.com/office/powerpoint/2010/main" id="1" dur="indefinite" restart="never" nodeType="tmRoot"/>
+        <p:cTn id="1" dur="indefinite" restart="never" nodeType="tmRoot"/>
       </p:par>
     </p:tnLst>
   </p:timing>
@@ -7382,7 +7423,7 @@
           <a:p>
             <a:fld id="{9DC39C20-1915-0B4C-94BB-C241F9675D6F}" type="datetime1">
               <a:rPr lang="en-US" smtClean="0"/>
-              <a:t>11/2/15</a:t>
+              <a:t>9/30/16</a:t>
             </a:fld>
             <a:endParaRPr lang="en-US"/>
           </a:p>
@@ -7444,13 +7485,13 @@
   <p:clrMapOvr>
     <a:masterClrMapping/>
   </p:clrMapOvr>
-  <mc:AlternateContent xmlns:mc="http://schemas.openxmlformats.org/markup-compatibility/2006">
-    <mc:Choice xmlns:p14="http://schemas.microsoft.com/office/powerpoint/2010/main" Requires="p14">
+  <mc:AlternateContent xmlns:mc="http://schemas.openxmlformats.org/markup-compatibility/2006" xmlns:p14="http://schemas.microsoft.com/office/powerpoint/2010/main">
+    <mc:Choice Requires="p14">
       <p:transition spd="slow" p14:dur="1200">
         <p14:prism/>
       </p:transition>
     </mc:Choice>
-    <mc:Fallback>
+    <mc:Fallback xmlns="">
       <p:transition xmlns:p14="http://schemas.microsoft.com/office/powerpoint/2010/main" spd="slow">
         <p:fade/>
       </p:transition>
@@ -7459,7 +7500,7 @@
   <p:timing>
     <p:tnLst>
       <p:par>
-        <p:cTn xmlns:p14="http://schemas.microsoft.com/office/powerpoint/2010/main" id="1" dur="indefinite" restart="never" nodeType="tmRoot"/>
+        <p:cTn id="1" dur="indefinite" restart="never" nodeType="tmRoot"/>
       </p:par>
     </p:tnLst>
   </p:timing>
@@ -8208,7 +8249,7 @@
           <a:p>
             <a:fld id="{80CCE689-5014-4742-BC31-9D0E35EB7125}" type="datetime1">
               <a:rPr lang="en-US" smtClean="0"/>
-              <a:t>11/2/15</a:t>
+              <a:t>9/30/16</a:t>
             </a:fld>
             <a:endParaRPr lang="en-US"/>
           </a:p>
@@ -8270,13 +8311,13 @@
   <p:clrMapOvr>
     <a:masterClrMapping/>
   </p:clrMapOvr>
-  <mc:AlternateContent xmlns:mc="http://schemas.openxmlformats.org/markup-compatibility/2006">
-    <mc:Choice xmlns:p14="http://schemas.microsoft.com/office/powerpoint/2010/main" Requires="p14">
+  <mc:AlternateContent xmlns:mc="http://schemas.openxmlformats.org/markup-compatibility/2006" xmlns:p14="http://schemas.microsoft.com/office/powerpoint/2010/main">
+    <mc:Choice Requires="p14">
       <p:transition spd="slow" p14:dur="1200">
         <p14:prism/>
       </p:transition>
     </mc:Choice>
-    <mc:Fallback>
+    <mc:Fallback xmlns="">
       <p:transition xmlns:p14="http://schemas.microsoft.com/office/powerpoint/2010/main" spd="slow">
         <p:fade/>
       </p:transition>
@@ -8285,7 +8326,7 @@
   <p:timing>
     <p:tnLst>
       <p:par>
-        <p:cTn xmlns:p14="http://schemas.microsoft.com/office/powerpoint/2010/main" id="1" dur="indefinite" restart="never" nodeType="tmRoot"/>
+        <p:cTn id="1" dur="indefinite" restart="never" nodeType="tmRoot"/>
       </p:par>
     </p:tnLst>
   </p:timing>
@@ -8374,7 +8415,7 @@
           <a:p>
             <a:fld id="{EA5A48A2-9086-0140-A4F9-92E6C804A01F}" type="datetime1">
               <a:rPr lang="en-US" smtClean="0"/>
-              <a:t>11/2/15</a:t>
+              <a:t>9/30/16</a:t>
             </a:fld>
             <a:endParaRPr lang="en-US"/>
           </a:p>
@@ -8436,13 +8477,13 @@
   <p:clrMapOvr>
     <a:masterClrMapping/>
   </p:clrMapOvr>
-  <mc:AlternateContent xmlns:mc="http://schemas.openxmlformats.org/markup-compatibility/2006">
-    <mc:Choice xmlns:p14="http://schemas.microsoft.com/office/powerpoint/2010/main" Requires="p14">
+  <mc:AlternateContent xmlns:mc="http://schemas.openxmlformats.org/markup-compatibility/2006" xmlns:p14="http://schemas.microsoft.com/office/powerpoint/2010/main">
+    <mc:Choice Requires="p14">
       <p:transition spd="slow" p14:dur="1200">
         <p14:prism/>
       </p:transition>
     </mc:Choice>
-    <mc:Fallback>
+    <mc:Fallback xmlns="">
       <p:transition xmlns:p14="http://schemas.microsoft.com/office/powerpoint/2010/main" spd="slow">
         <p:fade/>
       </p:transition>
@@ -8451,7 +8492,7 @@
   <p:timing>
     <p:tnLst>
       <p:par>
-        <p:cTn xmlns:p14="http://schemas.microsoft.com/office/powerpoint/2010/main" id="1" dur="indefinite" restart="never" nodeType="tmRoot"/>
+        <p:cTn id="1" dur="indefinite" restart="never" nodeType="tmRoot"/>
       </p:par>
     </p:tnLst>
   </p:timing>
@@ -8529,8 +8570,9 @@
             <a:pPr lvl="1"/>
             <a:r>
               <a:rPr lang="en-US" dirty="0" smtClean="0"/>
-              <a:t>Under utilized</a:t>
-            </a:r>
+              <a:t>Underutilized</a:t>
+            </a:r>
+            <a:endParaRPr lang="en-US" dirty="0" smtClean="0"/>
           </a:p>
           <a:p>
             <a:pPr lvl="1"/>
@@ -8579,7 +8621,7 @@
           <a:p>
             <a:fld id="{F97DC2D4-1DEE-924D-BDD9-74510BC5A24A}" type="datetime1">
               <a:rPr lang="en-US" smtClean="0"/>
-              <a:t>11/2/15</a:t>
+              <a:t>9/30/16</a:t>
             </a:fld>
             <a:endParaRPr lang="en-US"/>
           </a:p>
@@ -8641,13 +8683,13 @@
   <p:clrMapOvr>
     <a:masterClrMapping/>
   </p:clrMapOvr>
-  <mc:AlternateContent xmlns:mc="http://schemas.openxmlformats.org/markup-compatibility/2006">
-    <mc:Choice xmlns:p14="http://schemas.microsoft.com/office/powerpoint/2010/main" Requires="p14">
+  <mc:AlternateContent xmlns:mc="http://schemas.openxmlformats.org/markup-compatibility/2006" xmlns:p14="http://schemas.microsoft.com/office/powerpoint/2010/main">
+    <mc:Choice Requires="p14">
       <p:transition spd="slow" p14:dur="1200">
         <p14:prism/>
       </p:transition>
     </mc:Choice>
-    <mc:Fallback>
+    <mc:Fallback xmlns="">
       <p:transition xmlns:p14="http://schemas.microsoft.com/office/powerpoint/2010/main" spd="slow">
         <p:fade/>
       </p:transition>
@@ -8656,7 +8698,7 @@
   <p:timing>
     <p:tnLst>
       <p:par>
-        <p:cTn xmlns:p14="http://schemas.microsoft.com/office/powerpoint/2010/main" id="1" dur="indefinite" restart="never" nodeType="tmRoot"/>
+        <p:cTn id="1" dur="indefinite" restart="never" nodeType="tmRoot"/>
       </p:par>
     </p:tnLst>
   </p:timing>
@@ -8819,7 +8861,7 @@
           <a:p>
             <a:fld id="{8468245D-76B1-724E-AE68-0224BB61A615}" type="datetime1">
               <a:rPr lang="en-US" smtClean="0"/>
-              <a:t>11/2/15</a:t>
+              <a:t>9/30/16</a:t>
             </a:fld>
             <a:endParaRPr lang="en-US"/>
           </a:p>
@@ -8881,13 +8923,13 @@
   <p:clrMapOvr>
     <a:masterClrMapping/>
   </p:clrMapOvr>
-  <mc:AlternateContent xmlns:mc="http://schemas.openxmlformats.org/markup-compatibility/2006">
-    <mc:Choice xmlns:p14="http://schemas.microsoft.com/office/powerpoint/2010/main" Requires="p14">
+  <mc:AlternateContent xmlns:mc="http://schemas.openxmlformats.org/markup-compatibility/2006" xmlns:p14="http://schemas.microsoft.com/office/powerpoint/2010/main">
+    <mc:Choice Requires="p14">
       <p:transition spd="slow" p14:dur="1200">
         <p14:prism/>
       </p:transition>
     </mc:Choice>
-    <mc:Fallback>
+    <mc:Fallback xmlns="">
       <p:transition xmlns:p14="http://schemas.microsoft.com/office/powerpoint/2010/main" spd="slow">
         <p:fade/>
       </p:transition>
@@ -8990,7 +9032,7 @@
           <a:p>
             <a:fld id="{3C03960B-BE07-2C41-9088-65BE20BB1F53}" type="datetime1">
               <a:rPr lang="en-US" smtClean="0"/>
-              <a:t>11/2/15</a:t>
+              <a:t>9/30/16</a:t>
             </a:fld>
             <a:endParaRPr lang="en-US"/>
           </a:p>
@@ -9052,13 +9094,13 @@
   <p:clrMapOvr>
     <a:masterClrMapping/>
   </p:clrMapOvr>
-  <mc:AlternateContent xmlns:mc="http://schemas.openxmlformats.org/markup-compatibility/2006">
-    <mc:Choice xmlns:p14="http://schemas.microsoft.com/office/powerpoint/2010/main" Requires="p14">
+  <mc:AlternateContent xmlns:mc="http://schemas.openxmlformats.org/markup-compatibility/2006" xmlns:p14="http://schemas.microsoft.com/office/powerpoint/2010/main">
+    <mc:Choice Requires="p14">
       <p:transition spd="slow" p14:dur="1200">
         <p14:prism/>
       </p:transition>
     </mc:Choice>
-    <mc:Fallback>
+    <mc:Fallback xmlns="">
       <p:transition xmlns:p14="http://schemas.microsoft.com/office/powerpoint/2010/main" spd="slow">
         <p:fade/>
       </p:transition>
@@ -9188,7 +9230,7 @@
           <a:p>
             <a:fld id="{50C450D5-6D82-5C42-BDA9-FF5EE1E68817}" type="datetime1">
               <a:rPr lang="en-US" smtClean="0"/>
-              <a:t>11/2/15</a:t>
+              <a:t>9/30/16</a:t>
             </a:fld>
             <a:endParaRPr lang="en-US"/>
           </a:p>
@@ -9250,13 +9292,13 @@
   <p:clrMapOvr>
     <a:masterClrMapping/>
   </p:clrMapOvr>
-  <mc:AlternateContent xmlns:mc="http://schemas.openxmlformats.org/markup-compatibility/2006">
-    <mc:Choice xmlns:p14="http://schemas.microsoft.com/office/powerpoint/2010/main" Requires="p14">
+  <mc:AlternateContent xmlns:mc="http://schemas.openxmlformats.org/markup-compatibility/2006" xmlns:p14="http://schemas.microsoft.com/office/powerpoint/2010/main">
+    <mc:Choice Requires="p14">
       <p:transition spd="slow" p14:dur="1200">
         <p14:prism/>
       </p:transition>
     </mc:Choice>
-    <mc:Fallback>
+    <mc:Fallback xmlns="">
       <p:transition xmlns:p14="http://schemas.microsoft.com/office/powerpoint/2010/main" spd="slow">
         <p:fade/>
       </p:transition>
@@ -9347,7 +9389,7 @@
           <a:p>
             <a:fld id="{046ADE54-2BF8-1644-863D-4754878FCA6C}" type="datetime1">
               <a:rPr lang="en-US" smtClean="0"/>
-              <a:t>11/2/15</a:t>
+              <a:t>9/30/16</a:t>
             </a:fld>
             <a:endParaRPr lang="en-US"/>
           </a:p>
@@ -9409,13 +9451,13 @@
   <p:clrMapOvr>
     <a:masterClrMapping/>
   </p:clrMapOvr>
-  <mc:AlternateContent xmlns:mc="http://schemas.openxmlformats.org/markup-compatibility/2006">
-    <mc:Choice xmlns:p14="http://schemas.microsoft.com/office/powerpoint/2010/main" Requires="p14">
+  <mc:AlternateContent xmlns:mc="http://schemas.openxmlformats.org/markup-compatibility/2006" xmlns:p14="http://schemas.microsoft.com/office/powerpoint/2010/main">
+    <mc:Choice Requires="p14">
       <p:transition spd="slow" p14:dur="1200">
         <p14:prism/>
       </p:transition>
     </mc:Choice>
-    <mc:Fallback>
+    <mc:Fallback xmlns="">
       <p:transition xmlns:p14="http://schemas.microsoft.com/office/powerpoint/2010/main" spd="slow">
         <p:fade/>
       </p:transition>
@@ -9588,7 +9630,7 @@
           <a:p>
             <a:fld id="{959D32A1-6AE2-0244-A704-AEE91D4B484E}" type="datetime1">
               <a:rPr lang="en-US" smtClean="0"/>
-              <a:t>11/2/15</a:t>
+              <a:t>9/30/16</a:t>
             </a:fld>
             <a:endParaRPr lang="en-US"/>
           </a:p>
@@ -9650,13 +9692,13 @@
   <p:clrMapOvr>
     <a:masterClrMapping/>
   </p:clrMapOvr>
-  <mc:AlternateContent xmlns:mc="http://schemas.openxmlformats.org/markup-compatibility/2006">
-    <mc:Choice xmlns:p14="http://schemas.microsoft.com/office/powerpoint/2010/main" Requires="p14">
+  <mc:AlternateContent xmlns:mc="http://schemas.openxmlformats.org/markup-compatibility/2006" xmlns:p14="http://schemas.microsoft.com/office/powerpoint/2010/main">
+    <mc:Choice Requires="p14">
       <p:transition spd="slow" p14:dur="1200">
         <p14:prism/>
       </p:transition>
     </mc:Choice>
-    <mc:Fallback>
+    <mc:Fallback xmlns="">
       <p:transition xmlns:p14="http://schemas.microsoft.com/office/powerpoint/2010/main" spd="slow">
         <p:fade/>
       </p:transition>
@@ -9823,7 +9865,7 @@
           <a:p>
             <a:fld id="{F5C98D3C-6B0E-734C-8FF5-27C5993D166B}" type="datetime1">
               <a:rPr lang="en-US" smtClean="0"/>
-              <a:t>11/2/15</a:t>
+              <a:t>9/30/16</a:t>
             </a:fld>
             <a:endParaRPr lang="en-US"/>
           </a:p>
@@ -9885,13 +9927,13 @@
   <p:clrMapOvr>
     <a:masterClrMapping/>
   </p:clrMapOvr>
-  <mc:AlternateContent xmlns:mc="http://schemas.openxmlformats.org/markup-compatibility/2006">
-    <mc:Choice xmlns:p14="http://schemas.microsoft.com/office/powerpoint/2010/main" Requires="p14">
+  <mc:AlternateContent xmlns:mc="http://schemas.openxmlformats.org/markup-compatibility/2006" xmlns:p14="http://schemas.microsoft.com/office/powerpoint/2010/main">
+    <mc:Choice Requires="p14">
       <p:transition spd="slow" p14:dur="1200">
         <p14:prism/>
       </p:transition>
     </mc:Choice>
-    <mc:Fallback>
+    <mc:Fallback xmlns="">
       <p:transition xmlns:p14="http://schemas.microsoft.com/office/powerpoint/2010/main" spd="slow">
         <p:fade/>
       </p:transition>
@@ -10083,7 +10125,7 @@
           <a:p>
             <a:fld id="{C2B1EC2C-1122-B749-8C4E-EB3B7EBD16E5}" type="datetime1">
               <a:rPr lang="en-US" smtClean="0"/>
-              <a:t>11/2/15</a:t>
+              <a:t>9/30/16</a:t>
             </a:fld>
             <a:endParaRPr lang="en-US"/>
           </a:p>
@@ -10145,13 +10187,13 @@
   <p:clrMapOvr>
     <a:masterClrMapping/>
   </p:clrMapOvr>
-  <mc:AlternateContent xmlns:mc="http://schemas.openxmlformats.org/markup-compatibility/2006">
-    <mc:Choice xmlns:p14="http://schemas.microsoft.com/office/powerpoint/2010/main" Requires="p14">
+  <mc:AlternateContent xmlns:mc="http://schemas.openxmlformats.org/markup-compatibility/2006" xmlns:p14="http://schemas.microsoft.com/office/powerpoint/2010/main">
+    <mc:Choice Requires="p14">
       <p:transition spd="slow" p14:dur="1200">
         <p14:prism/>
       </p:transition>
     </mc:Choice>
-    <mc:Fallback>
+    <mc:Fallback xmlns="">
       <p:transition xmlns:p14="http://schemas.microsoft.com/office/powerpoint/2010/main" spd="slow">
         <p:fade/>
       </p:transition>
@@ -10236,8 +10278,13 @@
           <a:p>
             <a:r>
               <a:rPr lang="en-US" dirty="0"/>
-              <a:t>Jumbo grams</a:t>
-            </a:r>
+              <a:t>Jumbo </a:t>
+            </a:r>
+            <a:r>
+              <a:rPr lang="en-US" dirty="0" smtClean="0"/>
+              <a:t>grams/frames</a:t>
+            </a:r>
+            <a:endParaRPr lang="en-US" dirty="0"/>
           </a:p>
           <a:p>
             <a:r>
@@ -10269,7 +10316,7 @@
           <a:p>
             <a:fld id="{EF6A76B1-B78B-6C41-8B34-847611F65020}" type="datetime1">
               <a:rPr lang="en-US" smtClean="0"/>
-              <a:t>11/2/15</a:t>
+              <a:t>9/30/16</a:t>
             </a:fld>
             <a:endParaRPr lang="en-US"/>
           </a:p>
@@ -10331,13 +10378,13 @@
   <p:clrMapOvr>
     <a:masterClrMapping/>
   </p:clrMapOvr>
-  <mc:AlternateContent xmlns:mc="http://schemas.openxmlformats.org/markup-compatibility/2006">
-    <mc:Choice xmlns:p14="http://schemas.microsoft.com/office/powerpoint/2010/main" Requires="p14">
+  <mc:AlternateContent xmlns:mc="http://schemas.openxmlformats.org/markup-compatibility/2006" xmlns:p14="http://schemas.microsoft.com/office/powerpoint/2010/main">
+    <mc:Choice Requires="p14">
       <p:transition spd="slow" p14:dur="1200">
         <p14:prism/>
       </p:transition>
     </mc:Choice>
-    <mc:Fallback>
+    <mc:Fallback xmlns="">
       <p:transition xmlns:p14="http://schemas.microsoft.com/office/powerpoint/2010/main" spd="slow">
         <p:fade/>
       </p:transition>
@@ -10428,7 +10475,7 @@
           <a:p>
             <a:fld id="{F38A87DE-2B6F-E349-BB86-97C1F9B89DD1}" type="datetime1">
               <a:rPr lang="en-US" smtClean="0"/>
-              <a:t>11/2/15</a:t>
+              <a:t>9/30/16</a:t>
             </a:fld>
             <a:endParaRPr lang="en-US"/>
           </a:p>
@@ -10490,13 +10537,13 @@
   <p:clrMapOvr>
     <a:masterClrMapping/>
   </p:clrMapOvr>
-  <mc:AlternateContent xmlns:mc="http://schemas.openxmlformats.org/markup-compatibility/2006">
-    <mc:Choice xmlns:p14="http://schemas.microsoft.com/office/powerpoint/2010/main" Requires="p14">
+  <mc:AlternateContent xmlns:mc="http://schemas.openxmlformats.org/markup-compatibility/2006" xmlns:p14="http://schemas.microsoft.com/office/powerpoint/2010/main">
+    <mc:Choice Requires="p14">
       <p:transition spd="slow" p14:dur="1200">
         <p14:prism/>
       </p:transition>
     </mc:Choice>
-    <mc:Fallback>
+    <mc:Fallback xmlns="">
       <p:transition xmlns:p14="http://schemas.microsoft.com/office/powerpoint/2010/main" spd="slow">
         <p:fade/>
       </p:transition>
@@ -10537,7 +10584,11 @@
           <a:bodyPr/>
           <a:lstStyle/>
           <a:p>
-            <a:endParaRPr lang="en-US"/>
+            <a:r>
+              <a:rPr lang="en-US" dirty="0" smtClean="0"/>
+              <a:t>Timeline</a:t>
+            </a:r>
+            <a:endParaRPr lang="en-US" dirty="0"/>
           </a:p>
         </p:txBody>
       </p:sp>
@@ -10557,43 +10608,63 @@
           <a:lstStyle/>
           <a:p>
             <a:r>
-              <a:rPr lang="en-US" dirty="0"/>
+              <a:rPr lang="en-US" dirty="0">
+                <a:hlinkClick r:id="rId2"/>
+              </a:rPr>
               <a:t>http://</a:t>
             </a:r>
             <a:r>
-              <a:rPr lang="en-US" dirty="0" err="1"/>
+              <a:rPr lang="en-US" dirty="0" err="1">
+                <a:hlinkClick r:id="rId2"/>
+              </a:rPr>
               <a:t>www.cs.kent.edu</a:t>
             </a:r>
             <a:r>
-              <a:rPr lang="en-US" dirty="0"/>
+              <a:rPr lang="en-US" dirty="0">
+                <a:hlinkClick r:id="rId2"/>
+              </a:rPr>
               <a:t>/~</a:t>
             </a:r>
             <a:r>
-              <a:rPr lang="en-US" dirty="0" err="1"/>
+              <a:rPr lang="en-US" dirty="0" err="1">
+                <a:hlinkClick r:id="rId2"/>
+              </a:rPr>
               <a:t>javed</a:t>
             </a:r>
             <a:r>
-              <a:rPr lang="en-US" dirty="0"/>
+              <a:rPr lang="en-US" dirty="0">
+                <a:hlinkClick r:id="rId2"/>
+              </a:rPr>
               <a:t>/</a:t>
             </a:r>
             <a:r>
-              <a:rPr lang="en-US" dirty="0" err="1"/>
+              <a:rPr lang="en-US" dirty="0" err="1">
+                <a:hlinkClick r:id="rId2"/>
+              </a:rPr>
               <a:t>internetbook</a:t>
             </a:r>
             <a:r>
-              <a:rPr lang="en-US" dirty="0"/>
+              <a:rPr lang="en-US" dirty="0">
+                <a:hlinkClick r:id="rId2"/>
+              </a:rPr>
               <a:t>/</a:t>
             </a:r>
             <a:r>
-              <a:rPr lang="en-US" dirty="0" err="1"/>
+              <a:rPr lang="en-US" dirty="0" err="1">
+                <a:hlinkClick r:id="rId2"/>
+              </a:rPr>
               <a:t>hobbestimeline</a:t>
             </a:r>
             <a:r>
-              <a:rPr lang="en-US" dirty="0"/>
+              <a:rPr lang="en-US" dirty="0">
+                <a:hlinkClick r:id="rId2"/>
+              </a:rPr>
               <a:t>/</a:t>
             </a:r>
             <a:r>
-              <a:rPr lang="en-US" dirty="0" err="1"/>
+              <a:rPr lang="en-US" dirty="0" err="1">
+                <a:hlinkClick r:id="rId2"/>
+              </a:rPr>
               <a:t>HIT.html</a:t>
             </a:r>
             <a:endParaRPr lang="en-US" dirty="0"/>
@@ -10617,7 +10688,7 @@
           <a:p>
             <a:fld id="{7C5AE3D9-4BF6-8A48-A8F3-01D50412C56C}" type="datetime1">
               <a:rPr lang="en-US" smtClean="0"/>
-              <a:t>11/2/15</a:t>
+              <a:t>9/30/16</a:t>
             </a:fld>
             <a:endParaRPr lang="en-US"/>
           </a:p>
@@ -10679,13 +10750,13 @@
   <p:clrMapOvr>
     <a:masterClrMapping/>
   </p:clrMapOvr>
-  <mc:AlternateContent xmlns:mc="http://schemas.openxmlformats.org/markup-compatibility/2006">
-    <mc:Choice xmlns:p14="http://schemas.microsoft.com/office/powerpoint/2010/main" Requires="p14">
+  <mc:AlternateContent xmlns:mc="http://schemas.openxmlformats.org/markup-compatibility/2006" xmlns:p14="http://schemas.microsoft.com/office/powerpoint/2010/main">
+    <mc:Choice Requires="p14">
       <p:transition spd="slow" p14:dur="1200">
         <p14:prism/>
       </p:transition>
     </mc:Choice>
-    <mc:Fallback>
+    <mc:Fallback xmlns="">
       <p:transition xmlns:p14="http://schemas.microsoft.com/office/powerpoint/2010/main" spd="slow">
         <p:fade/>
       </p:transition>
@@ -10694,7 +10765,7 @@
   <p:timing>
     <p:tnLst>
       <p:par>
-        <p:cTn xmlns:p14="http://schemas.microsoft.com/office/powerpoint/2010/main" id="1" dur="indefinite" restart="never" nodeType="tmRoot"/>
+        <p:cTn id="1" dur="indefinite" restart="never" nodeType="tmRoot"/>
       </p:par>
     </p:tnLst>
   </p:timing>
@@ -10799,7 +10870,6 @@
               <a:rPr lang="en-US" dirty="0"/>
               <a:t>ff00::/8 </a:t>
             </a:r>
-            <a:endParaRPr lang="en-US" dirty="0"/>
           </a:p>
           <a:p>
             <a:pPr lvl="1"/>
@@ -10813,7 +10883,6 @@
               <a:rPr lang="en-US" dirty="0"/>
               <a:t>2001::/16 </a:t>
             </a:r>
-            <a:endParaRPr lang="en-US" dirty="0"/>
           </a:p>
           <a:p>
             <a:pPr lvl="1"/>
@@ -10841,7 +10910,7 @@
           <a:p>
             <a:fld id="{77B71530-2B73-9A4F-97EB-9C841698ADD3}" type="datetime1">
               <a:rPr lang="en-US" smtClean="0"/>
-              <a:t>11/2/15</a:t>
+              <a:t>9/30/16</a:t>
             </a:fld>
             <a:endParaRPr lang="en-US"/>
           </a:p>
@@ -10903,13 +10972,13 @@
   <p:clrMapOvr>
     <a:masterClrMapping/>
   </p:clrMapOvr>
-  <mc:AlternateContent xmlns:mc="http://schemas.openxmlformats.org/markup-compatibility/2006">
-    <mc:Choice xmlns:p14="http://schemas.microsoft.com/office/powerpoint/2010/main" Requires="p14">
+  <mc:AlternateContent xmlns:mc="http://schemas.openxmlformats.org/markup-compatibility/2006" xmlns:p14="http://schemas.microsoft.com/office/powerpoint/2010/main">
+    <mc:Choice Requires="p14">
       <p:transition spd="slow" p14:dur="1200">
         <p14:prism/>
       </p:transition>
     </mc:Choice>
-    <mc:Fallback>
+    <mc:Fallback xmlns="">
       <p:transition xmlns:p14="http://schemas.microsoft.com/office/powerpoint/2010/main" spd="slow">
         <p:fade/>
       </p:transition>
@@ -11263,7 +11332,7 @@
           <a:p>
             <a:fld id="{F07E1317-D26A-5E40-A256-1170A1E34BD3}" type="datetime1">
               <a:rPr lang="en-US" smtClean="0"/>
-              <a:t>11/2/15</a:t>
+              <a:t>9/30/16</a:t>
             </a:fld>
             <a:endParaRPr lang="en-US"/>
           </a:p>
@@ -11325,13 +11394,13 @@
   <p:clrMapOvr>
     <a:masterClrMapping/>
   </p:clrMapOvr>
-  <mc:AlternateContent xmlns:mc="http://schemas.openxmlformats.org/markup-compatibility/2006">
-    <mc:Choice xmlns:p14="http://schemas.microsoft.com/office/powerpoint/2010/main" Requires="p14">
+  <mc:AlternateContent xmlns:mc="http://schemas.openxmlformats.org/markup-compatibility/2006" xmlns:p14="http://schemas.microsoft.com/office/powerpoint/2010/main">
+    <mc:Choice Requires="p14">
       <p:transition spd="slow" p14:dur="1200">
         <p14:prism/>
       </p:transition>
     </mc:Choice>
-    <mc:Fallback>
+    <mc:Fallback xmlns="">
       <p:transition xmlns:p14="http://schemas.microsoft.com/office/powerpoint/2010/main" spd="slow">
         <p:fade/>
       </p:transition>
@@ -11437,7 +11506,7 @@
           <a:p>
             <a:fld id="{CFA09F04-6AD6-E34E-83FB-F282500CD445}" type="datetime1">
               <a:rPr lang="en-US" smtClean="0"/>
-              <a:t>11/2/15</a:t>
+              <a:t>9/30/16</a:t>
             </a:fld>
             <a:endParaRPr lang="en-US"/>
           </a:p>
@@ -11499,13 +11568,13 @@
   <p:clrMapOvr>
     <a:masterClrMapping/>
   </p:clrMapOvr>
-  <mc:AlternateContent xmlns:mc="http://schemas.openxmlformats.org/markup-compatibility/2006">
-    <mc:Choice xmlns:p14="http://schemas.microsoft.com/office/powerpoint/2010/main" Requires="p14">
+  <mc:AlternateContent xmlns:mc="http://schemas.openxmlformats.org/markup-compatibility/2006" xmlns:p14="http://schemas.microsoft.com/office/powerpoint/2010/main">
+    <mc:Choice Requires="p14">
       <p:transition spd="slow" p14:dur="1200">
         <p14:prism/>
       </p:transition>
     </mc:Choice>
-    <mc:Fallback>
+    <mc:Fallback xmlns="">
       <p:transition xmlns:p14="http://schemas.microsoft.com/office/powerpoint/2010/main" spd="slow">
         <p:fade/>
       </p:transition>
@@ -12150,10 +12219,6 @@
               </a:rPr>
               <a:t>]</a:t>
             </a:r>
-            <a:endParaRPr lang="en-US" sz="1600" dirty="0">
-              <a:latin typeface="Courier"/>
-              <a:cs typeface="Courier"/>
-            </a:endParaRPr>
           </a:p>
         </p:txBody>
       </p:sp>
@@ -12174,7 +12239,7 @@
           <a:p>
             <a:fld id="{F40B2BFF-41CC-EA47-9A9B-F3283C701681}" type="datetime1">
               <a:rPr lang="en-US" smtClean="0"/>
-              <a:t>11/2/15</a:t>
+              <a:t>9/30/16</a:t>
             </a:fld>
             <a:endParaRPr lang="en-US"/>
           </a:p>
@@ -12236,13 +12301,13 @@
   <p:clrMapOvr>
     <a:masterClrMapping/>
   </p:clrMapOvr>
-  <mc:AlternateContent xmlns:mc="http://schemas.openxmlformats.org/markup-compatibility/2006">
-    <mc:Choice xmlns:p14="http://schemas.microsoft.com/office/powerpoint/2010/main" Requires="p14">
+  <mc:AlternateContent xmlns:mc="http://schemas.openxmlformats.org/markup-compatibility/2006" xmlns:p14="http://schemas.microsoft.com/office/powerpoint/2010/main">
+    <mc:Choice Requires="p14">
       <p:transition spd="slow" p14:dur="1200">
         <p14:prism/>
       </p:transition>
     </mc:Choice>
-    <mc:Fallback>
+    <mc:Fallback xmlns="">
       <p:transition xmlns:p14="http://schemas.microsoft.com/office/powerpoint/2010/main" spd="slow">
         <p:fade/>
       </p:transition>
@@ -12358,7 +12423,7 @@
           <a:p>
             <a:fld id="{2D8E93FE-C914-3442-A246-504ACC8016A1}" type="datetime1">
               <a:rPr lang="en-US" smtClean="0"/>
-              <a:t>11/2/15</a:t>
+              <a:t>9/30/16</a:t>
             </a:fld>
             <a:endParaRPr lang="en-US"/>
           </a:p>
@@ -12420,13 +12485,13 @@
   <p:clrMapOvr>
     <a:masterClrMapping/>
   </p:clrMapOvr>
-  <mc:AlternateContent xmlns:mc="http://schemas.openxmlformats.org/markup-compatibility/2006">
-    <mc:Choice xmlns:p14="http://schemas.microsoft.com/office/powerpoint/2010/main" Requires="p14">
+  <mc:AlternateContent xmlns:mc="http://schemas.openxmlformats.org/markup-compatibility/2006" xmlns:p14="http://schemas.microsoft.com/office/powerpoint/2010/main">
+    <mc:Choice Requires="p14">
       <p:transition spd="slow" p14:dur="1200">
         <p14:prism/>
       </p:transition>
     </mc:Choice>
-    <mc:Fallback>
+    <mc:Fallback xmlns="">
       <p:transition xmlns:p14="http://schemas.microsoft.com/office/powerpoint/2010/main" spd="slow">
         <p:fade/>
       </p:transition>
@@ -12533,7 +12598,7 @@
           <a:p>
             <a:fld id="{E223680B-3A5C-C642-941C-B3E6846F6CE0}" type="datetime1">
               <a:rPr lang="en-US" smtClean="0"/>
-              <a:t>11/2/15</a:t>
+              <a:t>9/30/16</a:t>
             </a:fld>
             <a:endParaRPr lang="en-US"/>
           </a:p>
@@ -12595,13 +12660,13 @@
   <p:clrMapOvr>
     <a:masterClrMapping/>
   </p:clrMapOvr>
-  <mc:AlternateContent xmlns:mc="http://schemas.openxmlformats.org/markup-compatibility/2006">
-    <mc:Choice xmlns:p14="http://schemas.microsoft.com/office/powerpoint/2010/main" Requires="p14">
+  <mc:AlternateContent xmlns:mc="http://schemas.openxmlformats.org/markup-compatibility/2006" xmlns:p14="http://schemas.microsoft.com/office/powerpoint/2010/main">
+    <mc:Choice Requires="p14">
       <p:transition spd="slow" p14:dur="1200">
         <p14:prism/>
       </p:transition>
     </mc:Choice>
-    <mc:Fallback>
+    <mc:Fallback xmlns="">
       <p:transition xmlns:p14="http://schemas.microsoft.com/office/powerpoint/2010/main" spd="slow">
         <p:fade/>
       </p:transition>
@@ -12681,7 +12746,15 @@
             </a:r>
             <a:r>
               <a:rPr lang="en-US" dirty="0"/>
-              <a:t>-text attachments: audio, video, images, application programs etc.</a:t>
+              <a:t>-text attachments: audio, video, images, application </a:t>
+            </a:r>
+            <a:r>
+              <a:rPr lang="en-US" dirty="0" smtClean="0"/>
+              <a:t>programs, </a:t>
+            </a:r>
+            <a:r>
+              <a:rPr lang="en-US" dirty="0"/>
+              <a:t>etc.</a:t>
             </a:r>
           </a:p>
           <a:p>
@@ -12726,7 +12799,7 @@
           <a:p>
             <a:fld id="{9D923631-A1C7-2741-822B-FAC9C60202B2}" type="datetime1">
               <a:rPr lang="en-US" smtClean="0"/>
-              <a:t>11/2/15</a:t>
+              <a:t>9/30/16</a:t>
             </a:fld>
             <a:endParaRPr lang="en-US"/>
           </a:p>
@@ -12788,13 +12861,13 @@
   <p:clrMapOvr>
     <a:masterClrMapping/>
   </p:clrMapOvr>
-  <mc:AlternateContent xmlns:mc="http://schemas.openxmlformats.org/markup-compatibility/2006">
-    <mc:Choice xmlns:p14="http://schemas.microsoft.com/office/powerpoint/2010/main" Requires="p14">
+  <mc:AlternateContent xmlns:mc="http://schemas.openxmlformats.org/markup-compatibility/2006" xmlns:p14="http://schemas.microsoft.com/office/powerpoint/2010/main">
+    <mc:Choice Requires="p14">
       <p:transition spd="slow" p14:dur="1200">
         <p14:prism/>
       </p:transition>
     </mc:Choice>
-    <mc:Fallback>
+    <mc:Fallback xmlns="">
       <p:transition xmlns:p14="http://schemas.microsoft.com/office/powerpoint/2010/main" spd="slow">
         <p:fade/>
       </p:transition>
@@ -13023,7 +13096,7 @@
           <a:p>
             <a:fld id="{16BA121D-2368-674F-A291-08BB531505C0}" type="datetime1">
               <a:rPr lang="en-US" smtClean="0"/>
-              <a:t>11/2/15</a:t>
+              <a:t>9/30/16</a:t>
             </a:fld>
             <a:endParaRPr lang="en-US"/>
           </a:p>
@@ -13085,13 +13158,13 @@
   <p:clrMapOvr>
     <a:masterClrMapping/>
   </p:clrMapOvr>
-  <mc:AlternateContent xmlns:mc="http://schemas.openxmlformats.org/markup-compatibility/2006">
-    <mc:Choice xmlns:p14="http://schemas.microsoft.com/office/powerpoint/2010/main" Requires="p14">
+  <mc:AlternateContent xmlns:mc="http://schemas.openxmlformats.org/markup-compatibility/2006" xmlns:p14="http://schemas.microsoft.com/office/powerpoint/2010/main">
+    <mc:Choice Requires="p14">
       <p:transition spd="slow" p14:dur="1200">
         <p14:prism/>
       </p:transition>
     </mc:Choice>
-    <mc:Fallback>
+    <mc:Fallback xmlns="">
       <p:transition xmlns:p14="http://schemas.microsoft.com/office/powerpoint/2010/main" spd="slow">
         <p:fade/>
       </p:transition>
@@ -13213,7 +13286,7 @@
           <a:p>
             <a:fld id="{BBC3EE07-5420-E04D-9BC4-B6C8BB0232E8}" type="datetime1">
               <a:rPr lang="en-US" smtClean="0"/>
-              <a:t>11/2/15</a:t>
+              <a:t>9/30/16</a:t>
             </a:fld>
             <a:endParaRPr lang="en-US"/>
           </a:p>
@@ -13275,13 +13348,13 @@
   <p:clrMapOvr>
     <a:masterClrMapping/>
   </p:clrMapOvr>
-  <mc:AlternateContent xmlns:mc="http://schemas.openxmlformats.org/markup-compatibility/2006">
-    <mc:Choice xmlns:p14="http://schemas.microsoft.com/office/powerpoint/2010/main" Requires="p14">
+  <mc:AlternateContent xmlns:mc="http://schemas.openxmlformats.org/markup-compatibility/2006" xmlns:p14="http://schemas.microsoft.com/office/powerpoint/2010/main">
+    <mc:Choice Requires="p14">
       <p:transition spd="slow" p14:dur="1200">
         <p14:prism/>
       </p:transition>
     </mc:Choice>
-    <mc:Fallback>
+    <mc:Fallback xmlns="">
       <p:transition xmlns:p14="http://schemas.microsoft.com/office/powerpoint/2010/main" spd="slow">
         <p:fade/>
       </p:transition>
@@ -13430,7 +13503,7 @@
           <a:p>
             <a:fld id="{C2AFCF1E-1D01-7049-B17B-096A99DC043D}" type="datetime1">
               <a:rPr lang="en-US" smtClean="0"/>
-              <a:t>11/2/15</a:t>
+              <a:t>9/30/16</a:t>
             </a:fld>
             <a:endParaRPr lang="en-US"/>
           </a:p>
@@ -13492,13 +13565,13 @@
   <p:clrMapOvr>
     <a:masterClrMapping/>
   </p:clrMapOvr>
-  <mc:AlternateContent xmlns:mc="http://schemas.openxmlformats.org/markup-compatibility/2006">
-    <mc:Choice xmlns:p14="http://schemas.microsoft.com/office/powerpoint/2010/main" Requires="p14">
+  <mc:AlternateContent xmlns:mc="http://schemas.openxmlformats.org/markup-compatibility/2006" xmlns:p14="http://schemas.microsoft.com/office/powerpoint/2010/main">
+    <mc:Choice Requires="p14">
       <p:transition spd="slow" p14:dur="1200">
         <p14:prism/>
       </p:transition>
     </mc:Choice>
-    <mc:Fallback>
+    <mc:Fallback xmlns="">
       <p:transition xmlns:p14="http://schemas.microsoft.com/office/powerpoint/2010/main" spd="slow">
         <p:fade/>
       </p:transition>
@@ -13593,7 +13666,7 @@
           <a:p>
             <a:fld id="{9195EAD3-2966-EA40-8D5E-450BD97C95B8}" type="datetime1">
               <a:rPr lang="en-US" smtClean="0"/>
-              <a:t>11/2/15</a:t>
+              <a:t>9/30/16</a:t>
             </a:fld>
             <a:endParaRPr lang="en-US"/>
           </a:p>
@@ -13655,13 +13728,13 @@
   <p:clrMapOvr>
     <a:masterClrMapping/>
   </p:clrMapOvr>
-  <mc:AlternateContent xmlns:mc="http://schemas.openxmlformats.org/markup-compatibility/2006">
-    <mc:Choice xmlns:p14="http://schemas.microsoft.com/office/powerpoint/2010/main" Requires="p14">
+  <mc:AlternateContent xmlns:mc="http://schemas.openxmlformats.org/markup-compatibility/2006" xmlns:p14="http://schemas.microsoft.com/office/powerpoint/2010/main">
+    <mc:Choice Requires="p14">
       <p:transition spd="slow" p14:dur="1200">
         <p14:prism/>
       </p:transition>
     </mc:Choice>
-    <mc:Fallback>
+    <mc:Fallback xmlns="">
       <p:transition xmlns:p14="http://schemas.microsoft.com/office/powerpoint/2010/main" spd="slow">
         <p:fade/>
       </p:transition>
@@ -13670,7 +13743,7 @@
   <p:timing>
     <p:tnLst>
       <p:par>
-        <p:cTn xmlns:p14="http://schemas.microsoft.com/office/powerpoint/2010/main" id="1" dur="indefinite" restart="never" nodeType="tmRoot"/>
+        <p:cTn id="1" dur="indefinite" restart="never" nodeType="tmRoot"/>
       </p:par>
     </p:tnLst>
   </p:timing>
@@ -13779,7 +13852,7 @@
           <a:p>
             <a:fld id="{497EB3CB-F54B-3C4B-B1F7-81D70B45163E}" type="datetime1">
               <a:rPr lang="en-US" smtClean="0"/>
-              <a:t>11/2/15</a:t>
+              <a:t>9/30/16</a:t>
             </a:fld>
             <a:endParaRPr lang="en-US"/>
           </a:p>
@@ -13841,13 +13914,13 @@
   <p:clrMapOvr>
     <a:masterClrMapping/>
   </p:clrMapOvr>
-  <mc:AlternateContent xmlns:mc="http://schemas.openxmlformats.org/markup-compatibility/2006">
-    <mc:Choice xmlns:p14="http://schemas.microsoft.com/office/powerpoint/2010/main" Requires="p14">
+  <mc:AlternateContent xmlns:mc="http://schemas.openxmlformats.org/markup-compatibility/2006" xmlns:p14="http://schemas.microsoft.com/office/powerpoint/2010/main">
+    <mc:Choice Requires="p14">
       <p:transition spd="slow" p14:dur="1200">
         <p14:prism/>
       </p:transition>
     </mc:Choice>
-    <mc:Fallback>
+    <mc:Fallback xmlns="">
       <p:transition xmlns:p14="http://schemas.microsoft.com/office/powerpoint/2010/main" spd="slow">
         <p:fade/>
       </p:transition>
@@ -13967,7 +14040,7 @@
           <a:p>
             <a:fld id="{A939E7D8-33BC-1D41-ADD8-A28ECAFEBEAB}" type="datetime1">
               <a:rPr lang="en-US" smtClean="0"/>
-              <a:t>11/2/15</a:t>
+              <a:t>9/30/16</a:t>
             </a:fld>
             <a:endParaRPr lang="en-US"/>
           </a:p>
@@ -14029,13 +14102,13 @@
   <p:clrMapOvr>
     <a:masterClrMapping/>
   </p:clrMapOvr>
-  <mc:AlternateContent xmlns:mc="http://schemas.openxmlformats.org/markup-compatibility/2006">
-    <mc:Choice xmlns:p14="http://schemas.microsoft.com/office/powerpoint/2010/main" Requires="p14">
+  <mc:AlternateContent xmlns:mc="http://schemas.openxmlformats.org/markup-compatibility/2006" xmlns:p14="http://schemas.microsoft.com/office/powerpoint/2010/main">
+    <mc:Choice Requires="p14">
       <p:transition spd="slow" p14:dur="1200">
         <p14:prism/>
       </p:transition>
     </mc:Choice>
-    <mc:Fallback>
+    <mc:Fallback xmlns="">
       <p:transition xmlns:p14="http://schemas.microsoft.com/office/powerpoint/2010/main" spd="slow">
         <p:fade/>
       </p:transition>
@@ -14173,7 +14246,7 @@
           <a:p>
             <a:fld id="{DABDD4A4-EA92-514F-80BB-A786248291F0}" type="datetime1">
               <a:rPr lang="en-US" smtClean="0"/>
-              <a:t>11/2/15</a:t>
+              <a:t>9/30/16</a:t>
             </a:fld>
             <a:endParaRPr lang="en-US"/>
           </a:p>
@@ -14235,13 +14308,13 @@
   <p:clrMapOvr>
     <a:masterClrMapping/>
   </p:clrMapOvr>
-  <mc:AlternateContent xmlns:mc="http://schemas.openxmlformats.org/markup-compatibility/2006">
-    <mc:Choice xmlns:p14="http://schemas.microsoft.com/office/powerpoint/2010/main" Requires="p14">
+  <mc:AlternateContent xmlns:mc="http://schemas.openxmlformats.org/markup-compatibility/2006" xmlns:p14="http://schemas.microsoft.com/office/powerpoint/2010/main">
+    <mc:Choice Requires="p14">
       <p:transition spd="slow" p14:dur="1200">
         <p14:prism/>
       </p:transition>
     </mc:Choice>
-    <mc:Fallback>
+    <mc:Fallback xmlns="">
       <p:transition xmlns:p14="http://schemas.microsoft.com/office/powerpoint/2010/main" spd="slow">
         <p:fade/>
       </p:transition>
@@ -14370,7 +14443,7 @@
           <a:p>
             <a:fld id="{A05C90A6-BB2F-1446-A65D-8B9C4BF32E09}" type="datetime1">
               <a:rPr lang="en-US" smtClean="0"/>
-              <a:t>11/2/15</a:t>
+              <a:t>9/30/16</a:t>
             </a:fld>
             <a:endParaRPr lang="en-US"/>
           </a:p>
@@ -14432,13 +14505,13 @@
   <p:clrMapOvr>
     <a:masterClrMapping/>
   </p:clrMapOvr>
-  <mc:AlternateContent xmlns:mc="http://schemas.openxmlformats.org/markup-compatibility/2006">
-    <mc:Choice xmlns:p14="http://schemas.microsoft.com/office/powerpoint/2010/main" Requires="p14">
+  <mc:AlternateContent xmlns:mc="http://schemas.openxmlformats.org/markup-compatibility/2006" xmlns:p14="http://schemas.microsoft.com/office/powerpoint/2010/main">
+    <mc:Choice Requires="p14">
       <p:transition spd="slow" p14:dur="1200">
         <p14:prism/>
       </p:transition>
     </mc:Choice>
-    <mc:Fallback>
+    <mc:Fallback xmlns="">
       <p:transition xmlns:p14="http://schemas.microsoft.com/office/powerpoint/2010/main" spd="slow">
         <p:fade/>
       </p:transition>
@@ -14533,7 +14606,7 @@
           <a:p>
             <a:fld id="{33B32621-3116-F14E-9E85-828D65142E97}" type="datetime1">
               <a:rPr lang="en-US" smtClean="0"/>
-              <a:t>11/2/15</a:t>
+              <a:t>9/30/16</a:t>
             </a:fld>
             <a:endParaRPr lang="en-US"/>
           </a:p>
@@ -14595,13 +14668,13 @@
   <p:clrMapOvr>
     <a:masterClrMapping/>
   </p:clrMapOvr>
-  <mc:AlternateContent xmlns:mc="http://schemas.openxmlformats.org/markup-compatibility/2006">
-    <mc:Choice xmlns:p14="http://schemas.microsoft.com/office/powerpoint/2010/main" Requires="p14">
+  <mc:AlternateContent xmlns:mc="http://schemas.openxmlformats.org/markup-compatibility/2006" xmlns:p14="http://schemas.microsoft.com/office/powerpoint/2010/main">
+    <mc:Choice Requires="p14">
       <p:transition spd="slow" p14:dur="1200">
         <p14:prism/>
       </p:transition>
     </mc:Choice>
-    <mc:Fallback>
+    <mc:Fallback xmlns="">
       <p:transition xmlns:p14="http://schemas.microsoft.com/office/powerpoint/2010/main" spd="slow">
         <p:fade/>
       </p:transition>
@@ -14700,7 +14773,7 @@
           <a:p>
             <a:fld id="{C66921D9-BAF8-824E-A611-9E08C3604460}" type="datetime1">
               <a:rPr lang="en-US" smtClean="0"/>
-              <a:t>11/2/15</a:t>
+              <a:t>9/30/16</a:t>
             </a:fld>
             <a:endParaRPr lang="en-US"/>
           </a:p>
@@ -14762,13 +14835,13 @@
   <p:clrMapOvr>
     <a:masterClrMapping/>
   </p:clrMapOvr>
-  <mc:AlternateContent xmlns:mc="http://schemas.openxmlformats.org/markup-compatibility/2006">
-    <mc:Choice xmlns:p14="http://schemas.microsoft.com/office/powerpoint/2010/main" Requires="p14">
+  <mc:AlternateContent xmlns:mc="http://schemas.openxmlformats.org/markup-compatibility/2006" xmlns:p14="http://schemas.microsoft.com/office/powerpoint/2010/main">
+    <mc:Choice Requires="p14">
       <p:transition spd="slow" p14:dur="1200">
         <p14:prism/>
       </p:transition>
     </mc:Choice>
-    <mc:Fallback>
+    <mc:Fallback xmlns="">
       <p:transition xmlns:p14="http://schemas.microsoft.com/office/powerpoint/2010/main" spd="slow">
         <p:fade/>
       </p:transition>
@@ -14777,7 +14850,7 @@
   <p:timing>
     <p:tnLst>
       <p:par>
-        <p:cTn xmlns:p14="http://schemas.microsoft.com/office/powerpoint/2010/main" id="1" dur="indefinite" restart="never" nodeType="tmRoot"/>
+        <p:cTn id="1" dur="indefinite" restart="never" nodeType="tmRoot"/>
       </p:par>
     </p:tnLst>
   </p:timing>
@@ -14866,7 +14939,7 @@
           <a:p>
             <a:fld id="{D3887D09-5E72-6D44-87E0-A6E1779D8348}" type="datetime1">
               <a:rPr lang="en-US" smtClean="0"/>
-              <a:t>11/2/15</a:t>
+              <a:t>9/30/16</a:t>
             </a:fld>
             <a:endParaRPr lang="en-US"/>
           </a:p>
@@ -14928,13 +15001,13 @@
   <p:clrMapOvr>
     <a:masterClrMapping/>
   </p:clrMapOvr>
-  <mc:AlternateContent xmlns:mc="http://schemas.openxmlformats.org/markup-compatibility/2006">
-    <mc:Choice xmlns:p14="http://schemas.microsoft.com/office/powerpoint/2010/main" Requires="p14">
+  <mc:AlternateContent xmlns:mc="http://schemas.openxmlformats.org/markup-compatibility/2006" xmlns:p14="http://schemas.microsoft.com/office/powerpoint/2010/main">
+    <mc:Choice Requires="p14">
       <p:transition spd="slow" p14:dur="1200">
         <p14:prism/>
       </p:transition>
     </mc:Choice>
-    <mc:Fallback>
+    <mc:Fallback xmlns="">
       <p:transition xmlns:p14="http://schemas.microsoft.com/office/powerpoint/2010/main" spd="slow">
         <p:fade/>
       </p:transition>
@@ -14943,7 +15016,7 @@
   <p:timing>
     <p:tnLst>
       <p:par>
-        <p:cTn xmlns:p14="http://schemas.microsoft.com/office/powerpoint/2010/main" id="1" dur="indefinite" restart="never" nodeType="tmRoot"/>
+        <p:cTn id="1" dur="indefinite" restart="never" nodeType="tmRoot"/>
       </p:par>
     </p:tnLst>
   </p:timing>
@@ -15045,7 +15118,7 @@
           <a:p>
             <a:fld id="{4BA0D338-BE08-E04A-B8B6-F484758CF224}" type="datetime1">
               <a:rPr lang="en-US" smtClean="0"/>
-              <a:t>11/2/15</a:t>
+              <a:t>9/30/16</a:t>
             </a:fld>
             <a:endParaRPr lang="en-US"/>
           </a:p>
@@ -15107,13 +15180,13 @@
   <p:clrMapOvr>
     <a:masterClrMapping/>
   </p:clrMapOvr>
-  <mc:AlternateContent xmlns:mc="http://schemas.openxmlformats.org/markup-compatibility/2006">
-    <mc:Choice xmlns:p14="http://schemas.microsoft.com/office/powerpoint/2010/main" Requires="p14">
+  <mc:AlternateContent xmlns:mc="http://schemas.openxmlformats.org/markup-compatibility/2006" xmlns:p14="http://schemas.microsoft.com/office/powerpoint/2010/main">
+    <mc:Choice Requires="p14">
       <p:transition spd="slow" p14:dur="1200">
         <p14:prism/>
       </p:transition>
     </mc:Choice>
-    <mc:Fallback>
+    <mc:Fallback xmlns="">
       <p:transition xmlns:p14="http://schemas.microsoft.com/office/powerpoint/2010/main" spd="slow">
         <p:fade/>
       </p:transition>
@@ -15122,7 +15195,7 @@
   <p:timing>
     <p:tnLst>
       <p:par>
-        <p:cTn xmlns:p14="http://schemas.microsoft.com/office/powerpoint/2010/main" id="1" dur="indefinite" restart="never" nodeType="tmRoot"/>
+        <p:cTn id="1" dur="indefinite" restart="never" nodeType="tmRoot"/>
       </p:par>
     </p:tnLst>
   </p:timing>
@@ -15297,7 +15370,7 @@
           <a:p>
             <a:fld id="{C951EEA3-BFB6-E643-9EDB-DCA7FE1090BB}" type="datetime1">
               <a:rPr lang="en-US" smtClean="0"/>
-              <a:t>11/2/15</a:t>
+              <a:t>9/30/16</a:t>
             </a:fld>
             <a:endParaRPr lang="en-US"/>
           </a:p>
@@ -15359,13 +15432,13 @@
   <p:clrMapOvr>
     <a:masterClrMapping/>
   </p:clrMapOvr>
-  <mc:AlternateContent xmlns:mc="http://schemas.openxmlformats.org/markup-compatibility/2006">
-    <mc:Choice xmlns:p14="http://schemas.microsoft.com/office/powerpoint/2010/main" Requires="p14">
+  <mc:AlternateContent xmlns:mc="http://schemas.openxmlformats.org/markup-compatibility/2006" xmlns:p14="http://schemas.microsoft.com/office/powerpoint/2010/main">
+    <mc:Choice Requires="p14">
       <p:transition spd="slow" p14:dur="1200">
         <p14:prism/>
       </p:transition>
     </mc:Choice>
-    <mc:Fallback>
+    <mc:Fallback xmlns="">
       <p:transition xmlns:p14="http://schemas.microsoft.com/office/powerpoint/2010/main" spd="slow">
         <p:fade/>
       </p:transition>
@@ -15374,7 +15447,7 @@
   <p:timing>
     <p:tnLst>
       <p:par>
-        <p:cTn xmlns:p14="http://schemas.microsoft.com/office/powerpoint/2010/main" id="1" dur="indefinite" restart="never" nodeType="tmRoot"/>
+        <p:cTn id="1" dur="indefinite" restart="never" nodeType="tmRoot"/>
       </p:par>
     </p:tnLst>
   </p:timing>

</xml_diff>